<commit_message>
change on the draft
</commit_message>
<xml_diff>
--- a/documents/Group_12_2048.pptx
+++ b/documents/Group_12_2048.pptx
@@ -5078,7 +5078,7 @@
         </p:spPr>
         <p:txBody>
           <a:bodyPr>
-            <a:normAutofit fontScale="60000"/>
+            <a:normAutofit fontScale="67500" lnSpcReduction="10000"/>
           </a:bodyPr>
           <a:lstStyle/>
           <a:p>
@@ -5113,26 +5113,31 @@
           </a:p>
           <a:p>
             <a:r>
-              <a:rPr lang="en-US" dirty="0">
-                <a:sym typeface="+mn-ea"/>
-              </a:rPr>
-              <a:t>location(t1, loc) \/</a:t>
-            </a:r>
-            <a:r>
-              <a:rPr lang="en-CA" dirty="0">
+              <a:rPr lang="en-CA" b="0" i="0" dirty="0">
                 <a:solidFill>
                   <a:srgbClr val="1F1F1F"/>
                 </a:solidFill>
                 <a:effectLst/>
                 <a:latin typeface="Google Sans"/>
-                <a:sym typeface="+mn-ea"/>
               </a:rPr>
-              <a:t>  </a:t>
-            </a:r>
-            <a:r>
-              <a:rPr lang="en-US" dirty="0">
-                <a:sym typeface="+mn-ea"/>
+              <a:t>¬</a:t>
+            </a:r>
+            <a:r>
+              <a:rPr lang="en-US" dirty="0"/>
+              <a:t> location(t1, loc) \/</a:t>
+            </a:r>
+            <a:r>
+              <a:rPr lang="en-CA" b="0" i="0" dirty="0">
+                <a:solidFill>
+                  <a:srgbClr val="1F1F1F"/>
+                </a:solidFill>
+                <a:effectLst/>
+                <a:latin typeface="Google Sans"/>
               </a:rPr>
+              <a:t> ¬ </a:t>
+            </a:r>
+            <a:r>
+              <a:rPr lang="en-US" dirty="0"/>
               <a:t>location(t2, loc)</a:t>
             </a:r>
           </a:p>

</xml_diff>